<commit_message>
the indexing files look ok in terms of commenting.
</commit_message>
<xml_diff>
--- a/class diagram.pptx
+++ b/class diagram.pptx
@@ -3349,10 +3349,10 @@
       </p:grpSpPr>
       <p:grpSp>
         <p:nvGrpSpPr>
-          <p:cNvPr id="34" name="Group 33">
-            <a:extLst>
-              <a:ext uri="{FF2B5EF4-FFF2-40B4-BE49-F238E27FC236}">
-                <a16:creationId xmlns:a16="http://schemas.microsoft.com/office/drawing/2014/main" id="{A0F96E78-DFAA-407C-8125-E29797D64AFF}"/>
+          <p:cNvPr id="80" name="Group 79">
+            <a:extLst>
+              <a:ext uri="{FF2B5EF4-FFF2-40B4-BE49-F238E27FC236}">
+                <a16:creationId xmlns:a16="http://schemas.microsoft.com/office/drawing/2014/main" id="{BC17CF71-2B1F-4847-87D2-7A0639E61F2B}"/>
               </a:ext>
             </a:extLst>
           </p:cNvPr>
@@ -3361,248 +3361,12 @@
         </p:nvGrpSpPr>
         <p:grpSpPr>
           <a:xfrm>
-            <a:off x="254000" y="342900"/>
-            <a:ext cx="10064752" cy="6908800"/>
-            <a:chOff x="254000" y="342900"/>
-            <a:chExt cx="10064752" cy="6908800"/>
+            <a:off x="254000" y="293645"/>
+            <a:ext cx="10617210" cy="6522561"/>
+            <a:chOff x="254000" y="293645"/>
+            <a:chExt cx="10617210" cy="6522561"/>
           </a:xfrm>
         </p:grpSpPr>
-        <p:sp>
-          <p:nvSpPr>
-            <p:cNvPr id="33" name="Rectangle 32">
-              <a:extLst>
-                <a:ext uri="{FF2B5EF4-FFF2-40B4-BE49-F238E27FC236}">
-                  <a16:creationId xmlns:a16="http://schemas.microsoft.com/office/drawing/2014/main" id="{174FB6E3-17FA-42F2-91A9-557BB76451E5}"/>
-                </a:ext>
-              </a:extLst>
-            </p:cNvPr>
-            <p:cNvSpPr/>
-            <p:nvPr/>
-          </p:nvSpPr>
-          <p:spPr>
-            <a:xfrm>
-              <a:off x="254000" y="2984484"/>
-              <a:ext cx="1879600" cy="2123333"/>
-            </a:xfrm>
-            <a:prstGeom prst="rect">
-              <a:avLst/>
-            </a:prstGeom>
-            <a:solidFill>
-              <a:schemeClr val="accent1">
-                <a:lumMod val="40000"/>
-                <a:lumOff val="60000"/>
-              </a:schemeClr>
-            </a:solidFill>
-          </p:spPr>
-          <p:style>
-            <a:lnRef idx="2">
-              <a:schemeClr val="accent1">
-                <a:shade val="50000"/>
-              </a:schemeClr>
-            </a:lnRef>
-            <a:fillRef idx="1">
-              <a:schemeClr val="accent1"/>
-            </a:fillRef>
-            <a:effectRef idx="0">
-              <a:schemeClr val="accent1"/>
-            </a:effectRef>
-            <a:fontRef idx="minor">
-              <a:schemeClr val="lt1"/>
-            </a:fontRef>
-          </p:style>
-          <p:txBody>
-            <a:bodyPr rtlCol="0" anchor="b"/>
-            <a:lstStyle/>
-            <a:p>
-              <a:pPr algn="ctr"/>
-              <a:r>
-                <a:rPr lang="en-SG" b="1" dirty="0">
-                  <a:solidFill>
-                    <a:sysClr val="windowText" lastClr="000000"/>
-                  </a:solidFill>
-                </a:rPr>
-                <a:t>Testing units</a:t>
-              </a:r>
-            </a:p>
-          </p:txBody>
-        </p:sp>
-        <p:sp>
-          <p:nvSpPr>
-            <p:cNvPr id="32" name="Rectangle 31">
-              <a:extLst>
-                <a:ext uri="{FF2B5EF4-FFF2-40B4-BE49-F238E27FC236}">
-                  <a16:creationId xmlns:a16="http://schemas.microsoft.com/office/drawing/2014/main" id="{D376CCB1-C988-467F-B799-429FBB1E2C95}"/>
-                </a:ext>
-              </a:extLst>
-            </p:cNvPr>
-            <p:cNvSpPr/>
-            <p:nvPr/>
-          </p:nvSpPr>
-          <p:spPr>
-            <a:xfrm>
-              <a:off x="8426452" y="6025707"/>
-              <a:ext cx="1879600" cy="1225993"/>
-            </a:xfrm>
-            <a:prstGeom prst="rect">
-              <a:avLst/>
-            </a:prstGeom>
-            <a:solidFill>
-              <a:schemeClr val="accent1">
-                <a:lumMod val="40000"/>
-                <a:lumOff val="60000"/>
-              </a:schemeClr>
-            </a:solidFill>
-          </p:spPr>
-          <p:style>
-            <a:lnRef idx="2">
-              <a:schemeClr val="accent1">
-                <a:shade val="50000"/>
-              </a:schemeClr>
-            </a:lnRef>
-            <a:fillRef idx="1">
-              <a:schemeClr val="accent1"/>
-            </a:fillRef>
-            <a:effectRef idx="0">
-              <a:schemeClr val="accent1"/>
-            </a:effectRef>
-            <a:fontRef idx="minor">
-              <a:schemeClr val="lt1"/>
-            </a:fontRef>
-          </p:style>
-          <p:txBody>
-            <a:bodyPr rtlCol="0" anchor="b"/>
-            <a:lstStyle/>
-            <a:p>
-              <a:pPr algn="ctr"/>
-              <a:r>
-                <a:rPr lang="en-SG" b="1" dirty="0">
-                  <a:solidFill>
-                    <a:sysClr val="windowText" lastClr="000000"/>
-                  </a:solidFill>
-                </a:rPr>
-                <a:t>Query expansion</a:t>
-              </a:r>
-            </a:p>
-          </p:txBody>
-        </p:sp>
-        <p:sp>
-          <p:nvSpPr>
-            <p:cNvPr id="31" name="Rectangle 30">
-              <a:extLst>
-                <a:ext uri="{FF2B5EF4-FFF2-40B4-BE49-F238E27FC236}">
-                  <a16:creationId xmlns:a16="http://schemas.microsoft.com/office/drawing/2014/main" id="{F824F960-83C9-4D97-B9F1-2BCC09F30720}"/>
-                </a:ext>
-              </a:extLst>
-            </p:cNvPr>
-            <p:cNvSpPr/>
-            <p:nvPr/>
-          </p:nvSpPr>
-          <p:spPr>
-            <a:xfrm>
-              <a:off x="8439152" y="3210668"/>
-              <a:ext cx="1879600" cy="2552061"/>
-            </a:xfrm>
-            <a:prstGeom prst="rect">
-              <a:avLst/>
-            </a:prstGeom>
-            <a:solidFill>
-              <a:schemeClr val="accent1">
-                <a:lumMod val="40000"/>
-                <a:lumOff val="60000"/>
-              </a:schemeClr>
-            </a:solidFill>
-          </p:spPr>
-          <p:style>
-            <a:lnRef idx="2">
-              <a:schemeClr val="accent1">
-                <a:shade val="50000"/>
-              </a:schemeClr>
-            </a:lnRef>
-            <a:fillRef idx="1">
-              <a:schemeClr val="accent1"/>
-            </a:fillRef>
-            <a:effectRef idx="0">
-              <a:schemeClr val="accent1"/>
-            </a:effectRef>
-            <a:fontRef idx="minor">
-              <a:schemeClr val="lt1"/>
-            </a:fontRef>
-          </p:style>
-          <p:txBody>
-            <a:bodyPr rtlCol="0" anchor="b"/>
-            <a:lstStyle/>
-            <a:p>
-              <a:pPr algn="ctr"/>
-              <a:r>
-                <a:rPr lang="en-SG" b="1" dirty="0">
-                  <a:solidFill>
-                    <a:sysClr val="windowText" lastClr="000000"/>
-                  </a:solidFill>
-                </a:rPr>
-                <a:t>Query parsing and document ranking</a:t>
-              </a:r>
-            </a:p>
-          </p:txBody>
-        </p:sp>
-        <p:sp>
-          <p:nvSpPr>
-            <p:cNvPr id="21" name="Rectangle 20">
-              <a:extLst>
-                <a:ext uri="{FF2B5EF4-FFF2-40B4-BE49-F238E27FC236}">
-                  <a16:creationId xmlns:a16="http://schemas.microsoft.com/office/drawing/2014/main" id="{18BDC293-99FF-4021-8193-EA9FB1D2D54C}"/>
-                </a:ext>
-              </a:extLst>
-            </p:cNvPr>
-            <p:cNvSpPr/>
-            <p:nvPr/>
-          </p:nvSpPr>
-          <p:spPr>
-            <a:xfrm>
-              <a:off x="4337049" y="342900"/>
-              <a:ext cx="1879600" cy="2083722"/>
-            </a:xfrm>
-            <a:prstGeom prst="rect">
-              <a:avLst/>
-            </a:prstGeom>
-            <a:solidFill>
-              <a:schemeClr val="accent1">
-                <a:lumMod val="40000"/>
-                <a:lumOff val="60000"/>
-              </a:schemeClr>
-            </a:solidFill>
-          </p:spPr>
-          <p:style>
-            <a:lnRef idx="2">
-              <a:schemeClr val="accent1">
-                <a:shade val="50000"/>
-              </a:schemeClr>
-            </a:lnRef>
-            <a:fillRef idx="1">
-              <a:schemeClr val="accent1"/>
-            </a:fillRef>
-            <a:effectRef idx="0">
-              <a:schemeClr val="accent1"/>
-            </a:effectRef>
-            <a:fontRef idx="minor">
-              <a:schemeClr val="lt1"/>
-            </a:fontRef>
-          </p:style>
-          <p:txBody>
-            <a:bodyPr rtlCol="0" anchor="b"/>
-            <a:lstStyle/>
-            <a:p>
-              <a:pPr algn="ctr"/>
-              <a:r>
-                <a:rPr lang="en-SG" b="1" dirty="0">
-                  <a:solidFill>
-                    <a:sysClr val="windowText" lastClr="000000"/>
-                  </a:solidFill>
-                </a:rPr>
-                <a:t>Shared file names, accessors and weights used for searching</a:t>
-              </a:r>
-            </a:p>
-          </p:txBody>
-        </p:sp>
         <p:grpSp>
           <p:nvGrpSpPr>
             <p:cNvPr id="19" name="Group 18">
@@ -3778,53 +3542,133 @@
             </p:txBody>
           </p:sp>
         </p:grpSp>
-        <p:sp>
-          <p:nvSpPr>
-            <p:cNvPr id="6" name="Rectangle 5">
+        <p:grpSp>
+          <p:nvGrpSpPr>
+            <p:cNvPr id="56" name="Group 55">
               <a:extLst>
                 <a:ext uri="{FF2B5EF4-FFF2-40B4-BE49-F238E27FC236}">
-                  <a16:creationId xmlns:a16="http://schemas.microsoft.com/office/drawing/2014/main" id="{EE1AA018-8235-40EE-ADE0-328FDC743E63}"/>
+                  <a16:creationId xmlns:a16="http://schemas.microsoft.com/office/drawing/2014/main" id="{8D4071A9-A976-49AA-BE87-28BEE28F2758}"/>
                 </a:ext>
               </a:extLst>
             </p:cNvPr>
-            <p:cNvSpPr/>
+            <p:cNvGrpSpPr/>
             <p:nvPr/>
-          </p:nvSpPr>
-          <p:spPr>
+          </p:nvGrpSpPr>
+          <p:grpSpPr>
             <a:xfrm>
-              <a:off x="4457701" y="492466"/>
-              <a:ext cx="1638299" cy="666750"/>
+              <a:off x="4337049" y="342900"/>
+              <a:ext cx="1879600" cy="2083722"/>
+              <a:chOff x="4337049" y="342900"/>
+              <a:chExt cx="1879600" cy="2083722"/>
             </a:xfrm>
-            <a:prstGeom prst="rect">
-              <a:avLst/>
-            </a:prstGeom>
-          </p:spPr>
-          <p:style>
-            <a:lnRef idx="2">
-              <a:schemeClr val="accent6"/>
-            </a:lnRef>
-            <a:fillRef idx="1">
-              <a:schemeClr val="lt1"/>
-            </a:fillRef>
-            <a:effectRef idx="0">
-              <a:schemeClr val="accent6"/>
-            </a:effectRef>
-            <a:fontRef idx="minor">
-              <a:schemeClr val="dk1"/>
-            </a:fontRef>
-          </p:style>
-          <p:txBody>
-            <a:bodyPr rtlCol="0" anchor="ctr"/>
-            <a:lstStyle/>
-            <a:p>
-              <a:pPr algn="ctr"/>
-              <a:r>
-                <a:rPr lang="en-SG" sz="2000" dirty="0"/>
-                <a:t>constants</a:t>
-              </a:r>
-            </a:p>
-          </p:txBody>
-        </p:sp>
+          </p:grpSpPr>
+          <p:sp>
+            <p:nvSpPr>
+              <p:cNvPr id="21" name="Rectangle 20">
+                <a:extLst>
+                  <a:ext uri="{FF2B5EF4-FFF2-40B4-BE49-F238E27FC236}">
+                    <a16:creationId xmlns:a16="http://schemas.microsoft.com/office/drawing/2014/main" id="{18BDC293-99FF-4021-8193-EA9FB1D2D54C}"/>
+                  </a:ext>
+                </a:extLst>
+              </p:cNvPr>
+              <p:cNvSpPr/>
+              <p:nvPr/>
+            </p:nvSpPr>
+            <p:spPr>
+              <a:xfrm>
+                <a:off x="4337049" y="342900"/>
+                <a:ext cx="1879600" cy="2083722"/>
+              </a:xfrm>
+              <a:prstGeom prst="rect">
+                <a:avLst/>
+              </a:prstGeom>
+              <a:solidFill>
+                <a:schemeClr val="accent1">
+                  <a:lumMod val="40000"/>
+                  <a:lumOff val="60000"/>
+                </a:schemeClr>
+              </a:solidFill>
+            </p:spPr>
+            <p:style>
+              <a:lnRef idx="2">
+                <a:schemeClr val="accent1">
+                  <a:shade val="50000"/>
+                </a:schemeClr>
+              </a:lnRef>
+              <a:fillRef idx="1">
+                <a:schemeClr val="accent1"/>
+              </a:fillRef>
+              <a:effectRef idx="0">
+                <a:schemeClr val="accent1"/>
+              </a:effectRef>
+              <a:fontRef idx="minor">
+                <a:schemeClr val="lt1"/>
+              </a:fontRef>
+            </p:style>
+            <p:txBody>
+              <a:bodyPr rtlCol="0" anchor="b"/>
+              <a:lstStyle/>
+              <a:p>
+                <a:pPr algn="ctr"/>
+                <a:r>
+                  <a:rPr lang="en-SG" b="1" dirty="0">
+                    <a:solidFill>
+                      <a:sysClr val="windowText" lastClr="000000"/>
+                    </a:solidFill>
+                  </a:rPr>
+                  <a:t>Shared file names, accessors and weights used for searching</a:t>
+                </a:r>
+              </a:p>
+            </p:txBody>
+          </p:sp>
+          <p:sp>
+            <p:nvSpPr>
+              <p:cNvPr id="6" name="Rectangle 5">
+                <a:extLst>
+                  <a:ext uri="{FF2B5EF4-FFF2-40B4-BE49-F238E27FC236}">
+                    <a16:creationId xmlns:a16="http://schemas.microsoft.com/office/drawing/2014/main" id="{EE1AA018-8235-40EE-ADE0-328FDC743E63}"/>
+                  </a:ext>
+                </a:extLst>
+              </p:cNvPr>
+              <p:cNvSpPr/>
+              <p:nvPr/>
+            </p:nvSpPr>
+            <p:spPr>
+              <a:xfrm>
+                <a:off x="4457701" y="492466"/>
+                <a:ext cx="1638299" cy="666750"/>
+              </a:xfrm>
+              <a:prstGeom prst="rect">
+                <a:avLst/>
+              </a:prstGeom>
+            </p:spPr>
+            <p:style>
+              <a:lnRef idx="2">
+                <a:schemeClr val="accent6"/>
+              </a:lnRef>
+              <a:fillRef idx="1">
+                <a:schemeClr val="lt1"/>
+              </a:fillRef>
+              <a:effectRef idx="0">
+                <a:schemeClr val="accent6"/>
+              </a:effectRef>
+              <a:fontRef idx="minor">
+                <a:schemeClr val="dk1"/>
+              </a:fontRef>
+            </p:style>
+            <p:txBody>
+              <a:bodyPr rtlCol="0" anchor="ctr"/>
+              <a:lstStyle/>
+              <a:p>
+                <a:pPr algn="ctr"/>
+                <a:r>
+                  <a:rPr lang="en-SG" sz="2000" dirty="0"/>
+                  <a:t>constants</a:t>
+                </a:r>
+              </a:p>
+            </p:txBody>
+          </p:sp>
+        </p:grpSp>
         <p:sp>
           <p:nvSpPr>
             <p:cNvPr id="8" name="Rectangle 7">
@@ -3875,197 +3719,310 @@
             </a:p>
           </p:txBody>
         </p:sp>
-        <p:sp>
-          <p:nvSpPr>
-            <p:cNvPr id="9" name="Rectangle 8">
+        <p:grpSp>
+          <p:nvGrpSpPr>
+            <p:cNvPr id="59" name="Group 58">
               <a:extLst>
                 <a:ext uri="{FF2B5EF4-FFF2-40B4-BE49-F238E27FC236}">
-                  <a16:creationId xmlns:a16="http://schemas.microsoft.com/office/drawing/2014/main" id="{A2514CE5-B12B-486A-91B1-AD8CCA672478}"/>
+                  <a16:creationId xmlns:a16="http://schemas.microsoft.com/office/drawing/2014/main" id="{356D9D5D-E0FC-4636-AE94-DFDD9018D7A5}"/>
                 </a:ext>
               </a:extLst>
             </p:cNvPr>
-            <p:cNvSpPr/>
+            <p:cNvGrpSpPr/>
             <p:nvPr/>
-          </p:nvSpPr>
-          <p:spPr>
+          </p:nvGrpSpPr>
+          <p:grpSpPr>
             <a:xfrm>
-              <a:off x="8559801" y="4153323"/>
-              <a:ext cx="1638299" cy="666750"/>
+              <a:off x="254000" y="2984484"/>
+              <a:ext cx="1879600" cy="2123333"/>
+              <a:chOff x="254000" y="2984484"/>
+              <a:chExt cx="1879600" cy="2123333"/>
             </a:xfrm>
-            <a:prstGeom prst="rect">
-              <a:avLst/>
-            </a:prstGeom>
-          </p:spPr>
-          <p:style>
-            <a:lnRef idx="2">
-              <a:schemeClr val="accent6"/>
-            </a:lnRef>
-            <a:fillRef idx="1">
-              <a:schemeClr val="lt1"/>
-            </a:fillRef>
-            <a:effectRef idx="0">
-              <a:schemeClr val="accent6"/>
-            </a:effectRef>
-            <a:fontRef idx="minor">
-              <a:schemeClr val="dk1"/>
-            </a:fontRef>
-          </p:style>
-          <p:txBody>
-            <a:bodyPr rtlCol="0" anchor="ctr"/>
-            <a:lstStyle/>
-            <a:p>
-              <a:pPr algn="ctr"/>
-              <a:r>
-                <a:rPr lang="en-SG" sz="2000" dirty="0"/>
-                <a:t>Eval</a:t>
-              </a:r>
-            </a:p>
-          </p:txBody>
-        </p:sp>
-        <p:sp>
-          <p:nvSpPr>
-            <p:cNvPr id="10" name="Rectangle 9">
+          </p:grpSpPr>
+          <p:sp>
+            <p:nvSpPr>
+              <p:cNvPr id="33" name="Rectangle 32">
+                <a:extLst>
+                  <a:ext uri="{FF2B5EF4-FFF2-40B4-BE49-F238E27FC236}">
+                    <a16:creationId xmlns:a16="http://schemas.microsoft.com/office/drawing/2014/main" id="{174FB6E3-17FA-42F2-91A9-557BB76451E5}"/>
+                  </a:ext>
+                </a:extLst>
+              </p:cNvPr>
+              <p:cNvSpPr/>
+              <p:nvPr/>
+            </p:nvSpPr>
+            <p:spPr>
+              <a:xfrm>
+                <a:off x="254000" y="2984484"/>
+                <a:ext cx="1879600" cy="2123333"/>
+              </a:xfrm>
+              <a:prstGeom prst="rect">
+                <a:avLst/>
+              </a:prstGeom>
+              <a:solidFill>
+                <a:schemeClr val="accent1">
+                  <a:lumMod val="40000"/>
+                  <a:lumOff val="60000"/>
+                </a:schemeClr>
+              </a:solidFill>
+            </p:spPr>
+            <p:style>
+              <a:lnRef idx="2">
+                <a:schemeClr val="accent1">
+                  <a:shade val="50000"/>
+                </a:schemeClr>
+              </a:lnRef>
+              <a:fillRef idx="1">
+                <a:schemeClr val="accent1"/>
+              </a:fillRef>
+              <a:effectRef idx="0">
+                <a:schemeClr val="accent1"/>
+              </a:effectRef>
+              <a:fontRef idx="minor">
+                <a:schemeClr val="lt1"/>
+              </a:fontRef>
+            </p:style>
+            <p:txBody>
+              <a:bodyPr rtlCol="0" anchor="b"/>
+              <a:lstStyle/>
+              <a:p>
+                <a:pPr algn="ctr"/>
+                <a:r>
+                  <a:rPr lang="en-SG" b="1" dirty="0">
+                    <a:solidFill>
+                      <a:sysClr val="windowText" lastClr="000000"/>
+                    </a:solidFill>
+                  </a:rPr>
+                  <a:t>Testing units</a:t>
+                </a:r>
+              </a:p>
+            </p:txBody>
+          </p:sp>
+          <p:sp>
+            <p:nvSpPr>
+              <p:cNvPr id="10" name="Rectangle 9">
+                <a:extLst>
+                  <a:ext uri="{FF2B5EF4-FFF2-40B4-BE49-F238E27FC236}">
+                    <a16:creationId xmlns:a16="http://schemas.microsoft.com/office/drawing/2014/main" id="{046E2721-1DEC-44E8-9B65-D7BFA12D97F1}"/>
+                  </a:ext>
+                </a:extLst>
+              </p:cNvPr>
+              <p:cNvSpPr/>
+              <p:nvPr/>
+            </p:nvSpPr>
+            <p:spPr>
+              <a:xfrm>
+                <a:off x="379498" y="3114022"/>
+                <a:ext cx="1638299" cy="666750"/>
+              </a:xfrm>
+              <a:prstGeom prst="rect">
+                <a:avLst/>
+              </a:prstGeom>
+            </p:spPr>
+            <p:style>
+              <a:lnRef idx="2">
+                <a:schemeClr val="accent6"/>
+              </a:lnRef>
+              <a:fillRef idx="1">
+                <a:schemeClr val="lt1"/>
+              </a:fillRef>
+              <a:effectRef idx="0">
+                <a:schemeClr val="accent6"/>
+              </a:effectRef>
+              <a:fontRef idx="minor">
+                <a:schemeClr val="dk1"/>
+              </a:fontRef>
+            </p:style>
+            <p:txBody>
+              <a:bodyPr rtlCol="0" anchor="ctr"/>
+              <a:lstStyle/>
+              <a:p>
+                <a:pPr algn="ctr"/>
+                <a:r>
+                  <a:rPr lang="en-SG" sz="2000" dirty="0" err="1"/>
+                  <a:t>lookdoc</a:t>
+                </a:r>
+                <a:endParaRPr lang="en-SG" sz="2000" dirty="0"/>
+              </a:p>
+            </p:txBody>
+          </p:sp>
+          <p:sp>
+            <p:nvSpPr>
+              <p:cNvPr id="11" name="Rectangle 10">
+                <a:extLst>
+                  <a:ext uri="{FF2B5EF4-FFF2-40B4-BE49-F238E27FC236}">
+                    <a16:creationId xmlns:a16="http://schemas.microsoft.com/office/drawing/2014/main" id="{9487DB7F-A472-4945-B42A-723AB60CBF45}"/>
+                  </a:ext>
+                </a:extLst>
+              </p:cNvPr>
+              <p:cNvSpPr/>
+              <p:nvPr/>
+            </p:nvSpPr>
+            <p:spPr>
+              <a:xfrm>
+                <a:off x="379498" y="3945747"/>
+                <a:ext cx="1638299" cy="666750"/>
+              </a:xfrm>
+              <a:prstGeom prst="rect">
+                <a:avLst/>
+              </a:prstGeom>
+            </p:spPr>
+            <p:style>
+              <a:lnRef idx="2">
+                <a:schemeClr val="accent6"/>
+              </a:lnRef>
+              <a:fillRef idx="1">
+                <a:schemeClr val="lt1"/>
+              </a:fillRef>
+              <a:effectRef idx="0">
+                <a:schemeClr val="accent6"/>
+              </a:effectRef>
+              <a:fontRef idx="minor">
+                <a:schemeClr val="dk1"/>
+              </a:fontRef>
+            </p:style>
+            <p:txBody>
+              <a:bodyPr rtlCol="0" anchor="ctr"/>
+              <a:lstStyle/>
+              <a:p>
+                <a:pPr algn="ctr"/>
+                <a:r>
+                  <a:rPr lang="en-SG" sz="2000" dirty="0" err="1"/>
+                  <a:t>lookvector</a:t>
+                </a:r>
+                <a:endParaRPr lang="en-SG" sz="2000" dirty="0"/>
+              </a:p>
+            </p:txBody>
+          </p:sp>
+        </p:grpSp>
+        <p:grpSp>
+          <p:nvGrpSpPr>
+            <p:cNvPr id="61" name="Group 60">
               <a:extLst>
                 <a:ext uri="{FF2B5EF4-FFF2-40B4-BE49-F238E27FC236}">
-                  <a16:creationId xmlns:a16="http://schemas.microsoft.com/office/drawing/2014/main" id="{046E2721-1DEC-44E8-9B65-D7BFA12D97F1}"/>
+                  <a16:creationId xmlns:a16="http://schemas.microsoft.com/office/drawing/2014/main" id="{EABEBEB1-4243-45BD-B3EE-D21698F56DF0}"/>
                 </a:ext>
               </a:extLst>
             </p:cNvPr>
-            <p:cNvSpPr/>
+            <p:cNvGrpSpPr/>
             <p:nvPr/>
-          </p:nvSpPr>
-          <p:spPr>
+          </p:nvGrpSpPr>
+          <p:grpSpPr>
             <a:xfrm>
-              <a:off x="379498" y="3114022"/>
-              <a:ext cx="1638299" cy="666750"/>
+              <a:off x="6667504" y="5587252"/>
+              <a:ext cx="1879600" cy="1225993"/>
+              <a:chOff x="6667504" y="5587252"/>
+              <a:chExt cx="1879600" cy="1225993"/>
             </a:xfrm>
-            <a:prstGeom prst="rect">
-              <a:avLst/>
-            </a:prstGeom>
-          </p:spPr>
-          <p:style>
-            <a:lnRef idx="2">
-              <a:schemeClr val="accent6"/>
-            </a:lnRef>
-            <a:fillRef idx="1">
-              <a:schemeClr val="lt1"/>
-            </a:fillRef>
-            <a:effectRef idx="0">
-              <a:schemeClr val="accent6"/>
-            </a:effectRef>
-            <a:fontRef idx="minor">
-              <a:schemeClr val="dk1"/>
-            </a:fontRef>
-          </p:style>
-          <p:txBody>
-            <a:bodyPr rtlCol="0" anchor="ctr"/>
-            <a:lstStyle/>
-            <a:p>
-              <a:pPr algn="ctr"/>
-              <a:r>
-                <a:rPr lang="en-SG" sz="2000" dirty="0" err="1"/>
-                <a:t>lookdoc</a:t>
-              </a:r>
-              <a:endParaRPr lang="en-SG" sz="2000" dirty="0"/>
-            </a:p>
-          </p:txBody>
-        </p:sp>
-        <p:sp>
-          <p:nvSpPr>
-            <p:cNvPr id="11" name="Rectangle 10">
-              <a:extLst>
-                <a:ext uri="{FF2B5EF4-FFF2-40B4-BE49-F238E27FC236}">
-                  <a16:creationId xmlns:a16="http://schemas.microsoft.com/office/drawing/2014/main" id="{9487DB7F-A472-4945-B42A-723AB60CBF45}"/>
-                </a:ext>
-              </a:extLst>
-            </p:cNvPr>
-            <p:cNvSpPr/>
-            <p:nvPr/>
-          </p:nvSpPr>
-          <p:spPr>
-            <a:xfrm>
-              <a:off x="379498" y="3945747"/>
-              <a:ext cx="1638299" cy="666750"/>
-            </a:xfrm>
-            <a:prstGeom prst="rect">
-              <a:avLst/>
-            </a:prstGeom>
-          </p:spPr>
-          <p:style>
-            <a:lnRef idx="2">
-              <a:schemeClr val="accent6"/>
-            </a:lnRef>
-            <a:fillRef idx="1">
-              <a:schemeClr val="lt1"/>
-            </a:fillRef>
-            <a:effectRef idx="0">
-              <a:schemeClr val="accent6"/>
-            </a:effectRef>
-            <a:fontRef idx="minor">
-              <a:schemeClr val="dk1"/>
-            </a:fontRef>
-          </p:style>
-          <p:txBody>
-            <a:bodyPr rtlCol="0" anchor="ctr"/>
-            <a:lstStyle/>
-            <a:p>
-              <a:pPr algn="ctr"/>
-              <a:r>
-                <a:rPr lang="en-SG" sz="2000" dirty="0" err="1"/>
-                <a:t>lookvector</a:t>
-              </a:r>
-              <a:endParaRPr lang="en-SG" sz="2000" dirty="0"/>
-            </a:p>
-          </p:txBody>
-        </p:sp>
-        <p:sp>
-          <p:nvSpPr>
-            <p:cNvPr id="14" name="Rectangle 13">
-              <a:extLst>
-                <a:ext uri="{FF2B5EF4-FFF2-40B4-BE49-F238E27FC236}">
-                  <a16:creationId xmlns:a16="http://schemas.microsoft.com/office/drawing/2014/main" id="{5A4AAFAC-C945-40F3-AB1C-5639348A9760}"/>
-                </a:ext>
-              </a:extLst>
-            </p:cNvPr>
-            <p:cNvSpPr/>
-            <p:nvPr/>
-          </p:nvSpPr>
-          <p:spPr>
-            <a:xfrm>
-              <a:off x="8559801" y="6201184"/>
-              <a:ext cx="1638299" cy="666750"/>
-            </a:xfrm>
-            <a:prstGeom prst="rect">
-              <a:avLst/>
-            </a:prstGeom>
-          </p:spPr>
-          <p:style>
-            <a:lnRef idx="2">
-              <a:schemeClr val="accent6"/>
-            </a:lnRef>
-            <a:fillRef idx="1">
-              <a:schemeClr val="lt1"/>
-            </a:fillRef>
-            <a:effectRef idx="0">
-              <a:schemeClr val="accent6"/>
-            </a:effectRef>
-            <a:fontRef idx="minor">
-              <a:schemeClr val="dk1"/>
-            </a:fontRef>
-          </p:style>
-          <p:txBody>
-            <a:bodyPr rtlCol="0" anchor="ctr"/>
-            <a:lstStyle/>
-            <a:p>
-              <a:pPr algn="ctr"/>
-              <a:r>
-                <a:rPr lang="en-SG" sz="1600" dirty="0" err="1"/>
-                <a:t>QueryExpansion</a:t>
-              </a:r>
-              <a:endParaRPr lang="en-SG" sz="1600" dirty="0"/>
-            </a:p>
-          </p:txBody>
-        </p:sp>
+          </p:grpSpPr>
+          <p:sp>
+            <p:nvSpPr>
+              <p:cNvPr id="32" name="Rectangle 31">
+                <a:extLst>
+                  <a:ext uri="{FF2B5EF4-FFF2-40B4-BE49-F238E27FC236}">
+                    <a16:creationId xmlns:a16="http://schemas.microsoft.com/office/drawing/2014/main" id="{D376CCB1-C988-467F-B799-429FBB1E2C95}"/>
+                  </a:ext>
+                </a:extLst>
+              </p:cNvPr>
+              <p:cNvSpPr/>
+              <p:nvPr/>
+            </p:nvSpPr>
+            <p:spPr>
+              <a:xfrm>
+                <a:off x="6667504" y="5587252"/>
+                <a:ext cx="1879600" cy="1225993"/>
+              </a:xfrm>
+              <a:prstGeom prst="rect">
+                <a:avLst/>
+              </a:prstGeom>
+              <a:solidFill>
+                <a:schemeClr val="accent1">
+                  <a:lumMod val="40000"/>
+                  <a:lumOff val="60000"/>
+                </a:schemeClr>
+              </a:solidFill>
+            </p:spPr>
+            <p:style>
+              <a:lnRef idx="2">
+                <a:schemeClr val="accent1">
+                  <a:shade val="50000"/>
+                </a:schemeClr>
+              </a:lnRef>
+              <a:fillRef idx="1">
+                <a:schemeClr val="accent1"/>
+              </a:fillRef>
+              <a:effectRef idx="0">
+                <a:schemeClr val="accent1"/>
+              </a:effectRef>
+              <a:fontRef idx="minor">
+                <a:schemeClr val="lt1"/>
+              </a:fontRef>
+            </p:style>
+            <p:txBody>
+              <a:bodyPr rtlCol="0" anchor="b"/>
+              <a:lstStyle/>
+              <a:p>
+                <a:pPr algn="ctr"/>
+                <a:r>
+                  <a:rPr lang="en-SG" b="1" dirty="0">
+                    <a:solidFill>
+                      <a:sysClr val="windowText" lastClr="000000"/>
+                    </a:solidFill>
+                  </a:rPr>
+                  <a:t>Query expansion</a:t>
+                </a:r>
+              </a:p>
+            </p:txBody>
+          </p:sp>
+          <p:sp>
+            <p:nvSpPr>
+              <p:cNvPr id="14" name="Rectangle 13">
+                <a:extLst>
+                  <a:ext uri="{FF2B5EF4-FFF2-40B4-BE49-F238E27FC236}">
+                    <a16:creationId xmlns:a16="http://schemas.microsoft.com/office/drawing/2014/main" id="{5A4AAFAC-C945-40F3-AB1C-5639348A9760}"/>
+                  </a:ext>
+                </a:extLst>
+              </p:cNvPr>
+              <p:cNvSpPr/>
+              <p:nvPr/>
+            </p:nvSpPr>
+            <p:spPr>
+              <a:xfrm>
+                <a:off x="6800853" y="5762729"/>
+                <a:ext cx="1638299" cy="666750"/>
+              </a:xfrm>
+              <a:prstGeom prst="rect">
+                <a:avLst/>
+              </a:prstGeom>
+            </p:spPr>
+            <p:style>
+              <a:lnRef idx="2">
+                <a:schemeClr val="accent6"/>
+              </a:lnRef>
+              <a:fillRef idx="1">
+                <a:schemeClr val="lt1"/>
+              </a:fillRef>
+              <a:effectRef idx="0">
+                <a:schemeClr val="accent6"/>
+              </a:effectRef>
+              <a:fontRef idx="minor">
+                <a:schemeClr val="dk1"/>
+              </a:fontRef>
+            </p:style>
+            <p:txBody>
+              <a:bodyPr rtlCol="0" anchor="ctr"/>
+              <a:lstStyle/>
+              <a:p>
+                <a:pPr algn="ctr"/>
+                <a:r>
+                  <a:rPr lang="en-SG" sz="1600" dirty="0" err="1"/>
+                  <a:t>QueryExpansion</a:t>
+                </a:r>
+                <a:endParaRPr lang="en-SG" sz="1600" dirty="0"/>
+              </a:p>
+            </p:txBody>
+          </p:sp>
+        </p:grpSp>
         <p:grpSp>
           <p:nvGrpSpPr>
             <p:cNvPr id="30" name="Group 29">
@@ -4080,7 +4037,7 @@
           </p:nvGrpSpPr>
           <p:grpSpPr>
             <a:xfrm>
-              <a:off x="8439152" y="347798"/>
+              <a:off x="8991608" y="293645"/>
               <a:ext cx="1879600" cy="2552061"/>
               <a:chOff x="9886613" y="325232"/>
               <a:chExt cx="1879600" cy="2552061"/>
@@ -4234,7 +4191,7 @@
               <a:p>
                 <a:pPr algn="ctr"/>
                 <a:r>
-                  <a:rPr lang="en-SG"/>
+                  <a:rPr lang="en-SG" dirty="0" err="1"/>
                   <a:t>BooleanMerge</a:t>
                 </a:r>
                 <a:endParaRPr lang="en-SG" dirty="0"/>
@@ -4242,268 +4199,390 @@
             </p:txBody>
           </p:sp>
         </p:grpSp>
-        <p:sp>
-          <p:nvSpPr>
-            <p:cNvPr id="17" name="Rectangle 16">
+        <p:grpSp>
+          <p:nvGrpSpPr>
+            <p:cNvPr id="60" name="Group 59">
               <a:extLst>
                 <a:ext uri="{FF2B5EF4-FFF2-40B4-BE49-F238E27FC236}">
-                  <a16:creationId xmlns:a16="http://schemas.microsoft.com/office/drawing/2014/main" id="{33AF4CCD-765B-49CB-A738-F1787814FBB9}"/>
+                  <a16:creationId xmlns:a16="http://schemas.microsoft.com/office/drawing/2014/main" id="{2A6C24C1-3968-4FD3-830C-F432FA562947}"/>
                 </a:ext>
               </a:extLst>
             </p:cNvPr>
-            <p:cNvSpPr/>
+            <p:cNvGrpSpPr/>
             <p:nvPr/>
-          </p:nvSpPr>
-          <p:spPr>
+          </p:nvGrpSpPr>
+          <p:grpSpPr>
             <a:xfrm>
-              <a:off x="8559801" y="3340205"/>
-              <a:ext cx="1638299" cy="666750"/>
+              <a:off x="8991610" y="3270220"/>
+              <a:ext cx="1879600" cy="1703653"/>
+              <a:chOff x="8439152" y="3210668"/>
+              <a:chExt cx="1879600" cy="1703653"/>
             </a:xfrm>
-            <a:prstGeom prst="rect">
-              <a:avLst/>
-            </a:prstGeom>
-          </p:spPr>
-          <p:style>
-            <a:lnRef idx="2">
-              <a:schemeClr val="accent6"/>
-            </a:lnRef>
-            <a:fillRef idx="1">
-              <a:schemeClr val="lt1"/>
-            </a:fillRef>
-            <a:effectRef idx="0">
-              <a:schemeClr val="accent6"/>
-            </a:effectRef>
-            <a:fontRef idx="minor">
-              <a:schemeClr val="dk1"/>
-            </a:fontRef>
-          </p:style>
-          <p:txBody>
-            <a:bodyPr rtlCol="0" anchor="ctr"/>
-            <a:lstStyle/>
-            <a:p>
-              <a:pPr algn="ctr"/>
-              <a:r>
-                <a:rPr lang="en-SG" dirty="0" err="1"/>
-                <a:t>search_helper</a:t>
-              </a:r>
-              <a:endParaRPr lang="en-SG" dirty="0"/>
-            </a:p>
-          </p:txBody>
-        </p:sp>
-        <p:sp>
-          <p:nvSpPr>
-            <p:cNvPr id="24" name="Rectangle 23">
+          </p:grpSpPr>
+          <p:sp>
+            <p:nvSpPr>
+              <p:cNvPr id="31" name="Rectangle 30">
+                <a:extLst>
+                  <a:ext uri="{FF2B5EF4-FFF2-40B4-BE49-F238E27FC236}">
+                    <a16:creationId xmlns:a16="http://schemas.microsoft.com/office/drawing/2014/main" id="{F824F960-83C9-4D97-B9F1-2BCC09F30720}"/>
+                  </a:ext>
+                </a:extLst>
+              </p:cNvPr>
+              <p:cNvSpPr/>
+              <p:nvPr/>
+            </p:nvSpPr>
+            <p:spPr>
+              <a:xfrm>
+                <a:off x="8439152" y="3210668"/>
+                <a:ext cx="1879600" cy="1703653"/>
+              </a:xfrm>
+              <a:prstGeom prst="rect">
+                <a:avLst/>
+              </a:prstGeom>
+              <a:solidFill>
+                <a:schemeClr val="accent1">
+                  <a:lumMod val="40000"/>
+                  <a:lumOff val="60000"/>
+                </a:schemeClr>
+              </a:solidFill>
+            </p:spPr>
+            <p:style>
+              <a:lnRef idx="2">
+                <a:schemeClr val="accent1">
+                  <a:shade val="50000"/>
+                </a:schemeClr>
+              </a:lnRef>
+              <a:fillRef idx="1">
+                <a:schemeClr val="accent1"/>
+              </a:fillRef>
+              <a:effectRef idx="0">
+                <a:schemeClr val="accent1"/>
+              </a:effectRef>
+              <a:fontRef idx="minor">
+                <a:schemeClr val="lt1"/>
+              </a:fontRef>
+            </p:style>
+            <p:txBody>
+              <a:bodyPr rtlCol="0" anchor="b"/>
+              <a:lstStyle/>
+              <a:p>
+                <a:pPr algn="ctr"/>
+                <a:r>
+                  <a:rPr lang="en-SG" b="1" dirty="0">
+                    <a:solidFill>
+                      <a:sysClr val="windowText" lastClr="000000"/>
+                    </a:solidFill>
+                  </a:rPr>
+                  <a:t>Query parsing and posting list retrieval</a:t>
+                </a:r>
+              </a:p>
+            </p:txBody>
+          </p:sp>
+          <p:sp>
+            <p:nvSpPr>
+              <p:cNvPr id="17" name="Rectangle 16">
+                <a:extLst>
+                  <a:ext uri="{FF2B5EF4-FFF2-40B4-BE49-F238E27FC236}">
+                    <a16:creationId xmlns:a16="http://schemas.microsoft.com/office/drawing/2014/main" id="{33AF4CCD-765B-49CB-A738-F1787814FBB9}"/>
+                  </a:ext>
+                </a:extLst>
+              </p:cNvPr>
+              <p:cNvSpPr/>
+              <p:nvPr/>
+            </p:nvSpPr>
+            <p:spPr>
+              <a:xfrm>
+                <a:off x="8559801" y="3340205"/>
+                <a:ext cx="1638299" cy="666750"/>
+              </a:xfrm>
+              <a:prstGeom prst="rect">
+                <a:avLst/>
+              </a:prstGeom>
+            </p:spPr>
+            <p:style>
+              <a:lnRef idx="2">
+                <a:schemeClr val="accent6"/>
+              </a:lnRef>
+              <a:fillRef idx="1">
+                <a:schemeClr val="lt1"/>
+              </a:fillRef>
+              <a:effectRef idx="0">
+                <a:schemeClr val="accent6"/>
+              </a:effectRef>
+              <a:fontRef idx="minor">
+                <a:schemeClr val="dk1"/>
+              </a:fontRef>
+            </p:style>
+            <p:txBody>
+              <a:bodyPr rtlCol="0" anchor="ctr"/>
+              <a:lstStyle/>
+              <a:p>
+                <a:pPr algn="ctr"/>
+                <a:r>
+                  <a:rPr lang="en-SG" dirty="0" err="1"/>
+                  <a:t>search_helper</a:t>
+                </a:r>
+                <a:endParaRPr lang="en-SG" dirty="0"/>
+              </a:p>
+            </p:txBody>
+          </p:sp>
+        </p:grpSp>
+        <p:grpSp>
+          <p:nvGrpSpPr>
+            <p:cNvPr id="57" name="Group 56">
               <a:extLst>
                 <a:ext uri="{FF2B5EF4-FFF2-40B4-BE49-F238E27FC236}">
-                  <a16:creationId xmlns:a16="http://schemas.microsoft.com/office/drawing/2014/main" id="{40E29AA5-982C-4527-85D9-F598A9B63A7F}"/>
+                  <a16:creationId xmlns:a16="http://schemas.microsoft.com/office/drawing/2014/main" id="{E70E2EF8-3950-4EC1-A8B9-6EA1D076B962}"/>
                 </a:ext>
               </a:extLst>
             </p:cNvPr>
-            <p:cNvSpPr/>
+            <p:cNvGrpSpPr/>
             <p:nvPr/>
-          </p:nvSpPr>
-          <p:spPr>
+          </p:nvGrpSpPr>
+          <p:grpSpPr>
             <a:xfrm>
               <a:off x="4337049" y="2727727"/>
               <a:ext cx="1879600" cy="1703652"/>
+              <a:chOff x="4337049" y="2727727"/>
+              <a:chExt cx="1879600" cy="1703652"/>
             </a:xfrm>
-            <a:prstGeom prst="rect">
-              <a:avLst/>
-            </a:prstGeom>
-            <a:solidFill>
-              <a:schemeClr val="accent1">
-                <a:lumMod val="40000"/>
-                <a:lumOff val="60000"/>
-              </a:schemeClr>
-            </a:solidFill>
-          </p:spPr>
-          <p:style>
-            <a:lnRef idx="2">
-              <a:schemeClr val="accent1">
-                <a:shade val="50000"/>
-              </a:schemeClr>
-            </a:lnRef>
-            <a:fillRef idx="1">
-              <a:schemeClr val="accent1"/>
-            </a:fillRef>
-            <a:effectRef idx="0">
-              <a:schemeClr val="accent1"/>
-            </a:effectRef>
-            <a:fontRef idx="minor">
-              <a:schemeClr val="lt1"/>
-            </a:fontRef>
-          </p:style>
-          <p:txBody>
-            <a:bodyPr rtlCol="0" anchor="b"/>
-            <a:lstStyle/>
-            <a:p>
-              <a:pPr algn="ctr"/>
-              <a:r>
-                <a:rPr lang="en-SG" b="1" dirty="0">
-                  <a:solidFill>
-                    <a:sysClr val="windowText" lastClr="000000"/>
-                  </a:solidFill>
-                </a:rPr>
-                <a:t>Saving and loading of files from disk</a:t>
-              </a:r>
-            </a:p>
-          </p:txBody>
-        </p:sp>
-        <p:sp>
-          <p:nvSpPr>
-            <p:cNvPr id="25" name="Rectangle 24">
+          </p:grpSpPr>
+          <p:sp>
+            <p:nvSpPr>
+              <p:cNvPr id="24" name="Rectangle 23">
+                <a:extLst>
+                  <a:ext uri="{FF2B5EF4-FFF2-40B4-BE49-F238E27FC236}">
+                    <a16:creationId xmlns:a16="http://schemas.microsoft.com/office/drawing/2014/main" id="{40E29AA5-982C-4527-85D9-F598A9B63A7F}"/>
+                  </a:ext>
+                </a:extLst>
+              </p:cNvPr>
+              <p:cNvSpPr/>
+              <p:nvPr/>
+            </p:nvSpPr>
+            <p:spPr>
+              <a:xfrm>
+                <a:off x="4337049" y="2727727"/>
+                <a:ext cx="1879600" cy="1703652"/>
+              </a:xfrm>
+              <a:prstGeom prst="rect">
+                <a:avLst/>
+              </a:prstGeom>
+              <a:solidFill>
+                <a:schemeClr val="accent1">
+                  <a:lumMod val="40000"/>
+                  <a:lumOff val="60000"/>
+                </a:schemeClr>
+              </a:solidFill>
+            </p:spPr>
+            <p:style>
+              <a:lnRef idx="2">
+                <a:schemeClr val="accent1">
+                  <a:shade val="50000"/>
+                </a:schemeClr>
+              </a:lnRef>
+              <a:fillRef idx="1">
+                <a:schemeClr val="accent1"/>
+              </a:fillRef>
+              <a:effectRef idx="0">
+                <a:schemeClr val="accent1"/>
+              </a:effectRef>
+              <a:fontRef idx="minor">
+                <a:schemeClr val="lt1"/>
+              </a:fontRef>
+            </p:style>
+            <p:txBody>
+              <a:bodyPr rtlCol="0" anchor="b"/>
+              <a:lstStyle/>
+              <a:p>
+                <a:pPr algn="ctr"/>
+                <a:r>
+                  <a:rPr lang="en-SG" b="1" dirty="0">
+                    <a:solidFill>
+                      <a:sysClr val="windowText" lastClr="000000"/>
+                    </a:solidFill>
+                  </a:rPr>
+                  <a:t>Saving and loading of files from disk</a:t>
+                </a:r>
+              </a:p>
+            </p:txBody>
+          </p:sp>
+          <p:sp>
+            <p:nvSpPr>
+              <p:cNvPr id="25" name="Rectangle 24">
+                <a:extLst>
+                  <a:ext uri="{FF2B5EF4-FFF2-40B4-BE49-F238E27FC236}">
+                    <a16:creationId xmlns:a16="http://schemas.microsoft.com/office/drawing/2014/main" id="{0605617B-D569-4561-9FD7-81A080E12CFD}"/>
+                  </a:ext>
+                </a:extLst>
+              </p:cNvPr>
+              <p:cNvSpPr/>
+              <p:nvPr/>
+            </p:nvSpPr>
+            <p:spPr>
+              <a:xfrm>
+                <a:off x="4457701" y="2877293"/>
+                <a:ext cx="1638299" cy="666750"/>
+              </a:xfrm>
+              <a:prstGeom prst="rect">
+                <a:avLst/>
+              </a:prstGeom>
+            </p:spPr>
+            <p:style>
+              <a:lnRef idx="2">
+                <a:schemeClr val="accent6"/>
+              </a:lnRef>
+              <a:fillRef idx="1">
+                <a:schemeClr val="lt1"/>
+              </a:fillRef>
+              <a:effectRef idx="0">
+                <a:schemeClr val="accent6"/>
+              </a:effectRef>
+              <a:fontRef idx="minor">
+                <a:schemeClr val="dk1"/>
+              </a:fontRef>
+            </p:style>
+            <p:txBody>
+              <a:bodyPr rtlCol="0" anchor="ctr"/>
+              <a:lstStyle/>
+              <a:p>
+                <a:pPr algn="ctr"/>
+                <a:r>
+                  <a:rPr lang="en-SG" sz="2000" dirty="0" err="1"/>
+                  <a:t>data_helper</a:t>
+                </a:r>
+                <a:endParaRPr lang="en-SG" sz="2000" dirty="0"/>
+              </a:p>
+            </p:txBody>
+          </p:sp>
+        </p:grpSp>
+        <p:grpSp>
+          <p:nvGrpSpPr>
+            <p:cNvPr id="58" name="Group 57">
               <a:extLst>
                 <a:ext uri="{FF2B5EF4-FFF2-40B4-BE49-F238E27FC236}">
-                  <a16:creationId xmlns:a16="http://schemas.microsoft.com/office/drawing/2014/main" id="{0605617B-D569-4561-9FD7-81A080E12CFD}"/>
+                  <a16:creationId xmlns:a16="http://schemas.microsoft.com/office/drawing/2014/main" id="{C0A4D7D6-F19B-46D4-A92F-1F6094C05062}"/>
                 </a:ext>
               </a:extLst>
             </p:cNvPr>
-            <p:cNvSpPr/>
+            <p:cNvGrpSpPr/>
             <p:nvPr/>
-          </p:nvSpPr>
-          <p:spPr>
-            <a:xfrm>
-              <a:off x="4457701" y="2877293"/>
-              <a:ext cx="1638299" cy="666750"/>
-            </a:xfrm>
-            <a:prstGeom prst="rect">
-              <a:avLst/>
-            </a:prstGeom>
-          </p:spPr>
-          <p:style>
-            <a:lnRef idx="2">
-              <a:schemeClr val="accent6"/>
-            </a:lnRef>
-            <a:fillRef idx="1">
-              <a:schemeClr val="lt1"/>
-            </a:fillRef>
-            <a:effectRef idx="0">
-              <a:schemeClr val="accent6"/>
-            </a:effectRef>
-            <a:fontRef idx="minor">
-              <a:schemeClr val="dk1"/>
-            </a:fontRef>
-          </p:style>
-          <p:txBody>
-            <a:bodyPr rtlCol="0" anchor="ctr"/>
-            <a:lstStyle/>
-            <a:p>
-              <a:pPr algn="ctr"/>
-              <a:r>
-                <a:rPr lang="en-SG" sz="2000" dirty="0" err="1"/>
-                <a:t>data_helper</a:t>
-              </a:r>
-              <a:endParaRPr lang="en-SG" sz="2000" dirty="0"/>
-            </a:p>
-          </p:txBody>
-        </p:sp>
-        <p:sp>
-          <p:nvSpPr>
-            <p:cNvPr id="26" name="Rectangle 25">
-              <a:extLst>
-                <a:ext uri="{FF2B5EF4-FFF2-40B4-BE49-F238E27FC236}">
-                  <a16:creationId xmlns:a16="http://schemas.microsoft.com/office/drawing/2014/main" id="{22DABA33-3DFD-496B-9431-BA12A35C7275}"/>
-                </a:ext>
-              </a:extLst>
-            </p:cNvPr>
-            <p:cNvSpPr/>
-            <p:nvPr/>
-          </p:nvSpPr>
-          <p:spPr>
+          </p:nvGrpSpPr>
+          <p:grpSpPr>
             <a:xfrm>
               <a:off x="4343398" y="4732484"/>
-              <a:ext cx="1879600" cy="2290616"/>
+              <a:ext cx="1879600" cy="2083722"/>
+              <a:chOff x="4343398" y="4732484"/>
+              <a:chExt cx="1879600" cy="2083722"/>
             </a:xfrm>
-            <a:prstGeom prst="rect">
-              <a:avLst/>
-            </a:prstGeom>
-            <a:solidFill>
-              <a:schemeClr val="accent1">
-                <a:lumMod val="40000"/>
-                <a:lumOff val="60000"/>
-              </a:schemeClr>
-            </a:solidFill>
-          </p:spPr>
-          <p:style>
-            <a:lnRef idx="2">
-              <a:schemeClr val="accent1">
-                <a:shade val="50000"/>
-              </a:schemeClr>
-            </a:lnRef>
-            <a:fillRef idx="1">
-              <a:schemeClr val="accent1"/>
-            </a:fillRef>
-            <a:effectRef idx="0">
-              <a:schemeClr val="accent1"/>
-            </a:effectRef>
-            <a:fontRef idx="minor">
-              <a:schemeClr val="lt1"/>
-            </a:fontRef>
-          </p:style>
-          <p:txBody>
-            <a:bodyPr rtlCol="0" anchor="b"/>
-            <a:lstStyle/>
-            <a:p>
-              <a:pPr algn="ctr"/>
-              <a:r>
-                <a:rPr lang="en-SG" b="1" dirty="0">
-                  <a:solidFill>
-                    <a:sysClr val="windowText" lastClr="000000"/>
-                  </a:solidFill>
-                </a:rPr>
-                <a:t>Managing document metadata (length, court, vector for query expansion)</a:t>
-              </a:r>
-            </a:p>
-          </p:txBody>
-        </p:sp>
-        <p:sp>
-          <p:nvSpPr>
-            <p:cNvPr id="27" name="Rectangle 26">
-              <a:extLst>
-                <a:ext uri="{FF2B5EF4-FFF2-40B4-BE49-F238E27FC236}">
-                  <a16:creationId xmlns:a16="http://schemas.microsoft.com/office/drawing/2014/main" id="{78610706-D323-41FF-A2F7-D6F62EBBD19B}"/>
-                </a:ext>
-              </a:extLst>
-            </p:cNvPr>
-            <p:cNvSpPr/>
-            <p:nvPr/>
-          </p:nvSpPr>
-          <p:spPr>
-            <a:xfrm>
-              <a:off x="4464050" y="4882050"/>
-              <a:ext cx="1638299" cy="666750"/>
-            </a:xfrm>
-            <a:prstGeom prst="rect">
-              <a:avLst/>
-            </a:prstGeom>
-          </p:spPr>
-          <p:style>
-            <a:lnRef idx="2">
-              <a:schemeClr val="accent6"/>
-            </a:lnRef>
-            <a:fillRef idx="1">
-              <a:schemeClr val="lt1"/>
-            </a:fillRef>
-            <a:effectRef idx="0">
-              <a:schemeClr val="accent6"/>
-            </a:effectRef>
-            <a:fontRef idx="minor">
-              <a:schemeClr val="dk1"/>
-            </a:fontRef>
-          </p:style>
-          <p:txBody>
-            <a:bodyPr rtlCol="0" anchor="ctr"/>
-            <a:lstStyle/>
-            <a:p>
-              <a:pPr algn="ctr"/>
-              <a:r>
-                <a:rPr lang="en-SG" sz="1400" dirty="0" err="1"/>
-                <a:t>properties_helper</a:t>
-              </a:r>
-              <a:endParaRPr lang="en-SG" sz="1400" dirty="0"/>
-            </a:p>
-          </p:txBody>
-        </p:sp>
+          </p:grpSpPr>
+          <p:sp>
+            <p:nvSpPr>
+              <p:cNvPr id="26" name="Rectangle 25">
+                <a:extLst>
+                  <a:ext uri="{FF2B5EF4-FFF2-40B4-BE49-F238E27FC236}">
+                    <a16:creationId xmlns:a16="http://schemas.microsoft.com/office/drawing/2014/main" id="{22DABA33-3DFD-496B-9431-BA12A35C7275}"/>
+                  </a:ext>
+                </a:extLst>
+              </p:cNvPr>
+              <p:cNvSpPr/>
+              <p:nvPr/>
+            </p:nvSpPr>
+            <p:spPr>
+              <a:xfrm>
+                <a:off x="4343398" y="4732484"/>
+                <a:ext cx="1879600" cy="2083722"/>
+              </a:xfrm>
+              <a:prstGeom prst="rect">
+                <a:avLst/>
+              </a:prstGeom>
+              <a:solidFill>
+                <a:schemeClr val="accent1">
+                  <a:lumMod val="40000"/>
+                  <a:lumOff val="60000"/>
+                </a:schemeClr>
+              </a:solidFill>
+            </p:spPr>
+            <p:style>
+              <a:lnRef idx="2">
+                <a:schemeClr val="accent1">
+                  <a:shade val="50000"/>
+                </a:schemeClr>
+              </a:lnRef>
+              <a:fillRef idx="1">
+                <a:schemeClr val="accent1"/>
+              </a:fillRef>
+              <a:effectRef idx="0">
+                <a:schemeClr val="accent1"/>
+              </a:effectRef>
+              <a:fontRef idx="minor">
+                <a:schemeClr val="lt1"/>
+              </a:fontRef>
+            </p:style>
+            <p:txBody>
+              <a:bodyPr rtlCol="0" anchor="b"/>
+              <a:lstStyle/>
+              <a:p>
+                <a:pPr algn="ctr"/>
+                <a:r>
+                  <a:rPr lang="en-SG" b="1" dirty="0">
+                    <a:solidFill>
+                      <a:sysClr val="windowText" lastClr="000000"/>
+                    </a:solidFill>
+                  </a:rPr>
+                  <a:t>Document metadata (length, court, vector offset)</a:t>
+                </a:r>
+              </a:p>
+            </p:txBody>
+          </p:sp>
+          <p:sp>
+            <p:nvSpPr>
+              <p:cNvPr id="27" name="Rectangle 26">
+                <a:extLst>
+                  <a:ext uri="{FF2B5EF4-FFF2-40B4-BE49-F238E27FC236}">
+                    <a16:creationId xmlns:a16="http://schemas.microsoft.com/office/drawing/2014/main" id="{78610706-D323-41FF-A2F7-D6F62EBBD19B}"/>
+                  </a:ext>
+                </a:extLst>
+              </p:cNvPr>
+              <p:cNvSpPr/>
+              <p:nvPr/>
+            </p:nvSpPr>
+            <p:spPr>
+              <a:xfrm>
+                <a:off x="4464050" y="4882050"/>
+                <a:ext cx="1638299" cy="666750"/>
+              </a:xfrm>
+              <a:prstGeom prst="rect">
+                <a:avLst/>
+              </a:prstGeom>
+            </p:spPr>
+            <p:style>
+              <a:lnRef idx="2">
+                <a:schemeClr val="accent6"/>
+              </a:lnRef>
+              <a:fillRef idx="1">
+                <a:schemeClr val="lt1"/>
+              </a:fillRef>
+              <a:effectRef idx="0">
+                <a:schemeClr val="accent6"/>
+              </a:effectRef>
+              <a:fontRef idx="minor">
+                <a:schemeClr val="dk1"/>
+              </a:fontRef>
+            </p:style>
+            <p:txBody>
+              <a:bodyPr rtlCol="0" anchor="ctr"/>
+              <a:lstStyle/>
+              <a:p>
+                <a:pPr algn="ctr"/>
+                <a:r>
+                  <a:rPr lang="en-SG" sz="1400" dirty="0" err="1"/>
+                  <a:t>properties_helper</a:t>
+                </a:r>
+                <a:endParaRPr lang="en-SG" sz="1400" dirty="0"/>
+              </a:p>
+            </p:txBody>
+          </p:sp>
+        </p:grpSp>
         <p:sp>
           <p:nvSpPr>
             <p:cNvPr id="28" name="Rectangle 27">
@@ -4518,7 +4597,7 @@
           </p:nvSpPr>
           <p:spPr>
             <a:xfrm>
-              <a:off x="6515938" y="3095625"/>
+              <a:off x="6831775" y="3095625"/>
               <a:ext cx="1638299" cy="666750"/>
             </a:xfrm>
             <a:prstGeom prst="rect">
@@ -4554,6 +4633,663 @@
             </a:p>
           </p:txBody>
         </p:sp>
+        <p:cxnSp>
+          <p:nvCxnSpPr>
+            <p:cNvPr id="3" name="Straight Connector 2">
+              <a:extLst>
+                <a:ext uri="{FF2B5EF4-FFF2-40B4-BE49-F238E27FC236}">
+                  <a16:creationId xmlns:a16="http://schemas.microsoft.com/office/drawing/2014/main" id="{A6F00EE7-649B-4C9F-A320-F85A7D1FE7C4}"/>
+                </a:ext>
+              </a:extLst>
+            </p:cNvPr>
+            <p:cNvCxnSpPr>
+              <a:cxnSpLocks/>
+              <a:endCxn id="18" idx="3"/>
+            </p:cNvCxnSpPr>
+            <p:nvPr/>
+          </p:nvCxnSpPr>
+          <p:spPr>
+            <a:xfrm flipH="1" flipV="1">
+              <a:off x="2133600" y="1529124"/>
+              <a:ext cx="695325" cy="1566501"/>
+            </a:xfrm>
+            <a:prstGeom prst="line">
+              <a:avLst/>
+            </a:prstGeom>
+            <a:ln w="19050">
+              <a:solidFill>
+                <a:schemeClr val="tx1"/>
+              </a:solidFill>
+            </a:ln>
+          </p:spPr>
+          <p:style>
+            <a:lnRef idx="1">
+              <a:schemeClr val="accent1"/>
+            </a:lnRef>
+            <a:fillRef idx="0">
+              <a:schemeClr val="accent1"/>
+            </a:fillRef>
+            <a:effectRef idx="0">
+              <a:schemeClr val="accent1"/>
+            </a:effectRef>
+            <a:fontRef idx="minor">
+              <a:schemeClr val="tx1"/>
+            </a:fontRef>
+          </p:style>
+        </p:cxnSp>
+        <p:cxnSp>
+          <p:nvCxnSpPr>
+            <p:cNvPr id="35" name="Straight Connector 34">
+              <a:extLst>
+                <a:ext uri="{FF2B5EF4-FFF2-40B4-BE49-F238E27FC236}">
+                  <a16:creationId xmlns:a16="http://schemas.microsoft.com/office/drawing/2014/main" id="{9E2D5BDB-1488-4D30-A888-D7A999A161A0}"/>
+                </a:ext>
+              </a:extLst>
+            </p:cNvPr>
+            <p:cNvCxnSpPr>
+              <a:cxnSpLocks/>
+            </p:cNvCxnSpPr>
+            <p:nvPr/>
+          </p:nvCxnSpPr>
+          <p:spPr>
+            <a:xfrm flipV="1">
+              <a:off x="2133600" y="3780772"/>
+              <a:ext cx="581026" cy="524528"/>
+            </a:xfrm>
+            <a:prstGeom prst="line">
+              <a:avLst/>
+            </a:prstGeom>
+            <a:ln w="19050">
+              <a:solidFill>
+                <a:schemeClr val="tx1"/>
+              </a:solidFill>
+            </a:ln>
+          </p:spPr>
+          <p:style>
+            <a:lnRef idx="1">
+              <a:schemeClr val="accent1"/>
+            </a:lnRef>
+            <a:fillRef idx="0">
+              <a:schemeClr val="accent1"/>
+            </a:fillRef>
+            <a:effectRef idx="0">
+              <a:schemeClr val="accent1"/>
+            </a:effectRef>
+            <a:fontRef idx="minor">
+              <a:schemeClr val="tx1"/>
+            </a:fontRef>
+          </p:style>
+        </p:cxnSp>
+        <p:cxnSp>
+          <p:nvCxnSpPr>
+            <p:cNvPr id="36" name="Straight Connector 35">
+              <a:extLst>
+                <a:ext uri="{FF2B5EF4-FFF2-40B4-BE49-F238E27FC236}">
+                  <a16:creationId xmlns:a16="http://schemas.microsoft.com/office/drawing/2014/main" id="{17EC4DF7-F619-4A5B-BBA9-8A102AE2B5E7}"/>
+                </a:ext>
+              </a:extLst>
+            </p:cNvPr>
+            <p:cNvCxnSpPr>
+              <a:cxnSpLocks/>
+              <a:stCxn id="21" idx="1"/>
+            </p:cNvCxnSpPr>
+            <p:nvPr/>
+          </p:nvCxnSpPr>
+          <p:spPr>
+            <a:xfrm flipH="1">
+              <a:off x="3752849" y="1384761"/>
+              <a:ext cx="584200" cy="1692467"/>
+            </a:xfrm>
+            <a:prstGeom prst="line">
+              <a:avLst/>
+            </a:prstGeom>
+            <a:ln w="19050">
+              <a:solidFill>
+                <a:schemeClr val="tx1"/>
+              </a:solidFill>
+            </a:ln>
+          </p:spPr>
+          <p:style>
+            <a:lnRef idx="1">
+              <a:schemeClr val="accent1"/>
+            </a:lnRef>
+            <a:fillRef idx="0">
+              <a:schemeClr val="accent1"/>
+            </a:fillRef>
+            <a:effectRef idx="0">
+              <a:schemeClr val="accent1"/>
+            </a:effectRef>
+            <a:fontRef idx="minor">
+              <a:schemeClr val="tx1"/>
+            </a:fontRef>
+          </p:style>
+        </p:cxnSp>
+        <p:cxnSp>
+          <p:nvCxnSpPr>
+            <p:cNvPr id="37" name="Straight Connector 36">
+              <a:extLst>
+                <a:ext uri="{FF2B5EF4-FFF2-40B4-BE49-F238E27FC236}">
+                  <a16:creationId xmlns:a16="http://schemas.microsoft.com/office/drawing/2014/main" id="{0F2EF10C-B776-4E79-8F0D-BEA8A5D0571C}"/>
+                </a:ext>
+              </a:extLst>
+            </p:cNvPr>
+            <p:cNvCxnSpPr>
+              <a:cxnSpLocks/>
+              <a:stCxn id="24" idx="1"/>
+              <a:endCxn id="8" idx="3"/>
+            </p:cNvCxnSpPr>
+            <p:nvPr/>
+          </p:nvCxnSpPr>
+          <p:spPr>
+            <a:xfrm flipH="1" flipV="1">
+              <a:off x="4056814" y="3429000"/>
+              <a:ext cx="280235" cy="150553"/>
+            </a:xfrm>
+            <a:prstGeom prst="line">
+              <a:avLst/>
+            </a:prstGeom>
+            <a:ln w="19050">
+              <a:solidFill>
+                <a:schemeClr val="tx1"/>
+              </a:solidFill>
+            </a:ln>
+          </p:spPr>
+          <p:style>
+            <a:lnRef idx="1">
+              <a:schemeClr val="accent1"/>
+            </a:lnRef>
+            <a:fillRef idx="0">
+              <a:schemeClr val="accent1"/>
+            </a:fillRef>
+            <a:effectRef idx="0">
+              <a:schemeClr val="accent1"/>
+            </a:effectRef>
+            <a:fontRef idx="minor">
+              <a:schemeClr val="tx1"/>
+            </a:fontRef>
+          </p:style>
+        </p:cxnSp>
+        <p:cxnSp>
+          <p:nvCxnSpPr>
+            <p:cNvPr id="39" name="Straight Connector 38">
+              <a:extLst>
+                <a:ext uri="{FF2B5EF4-FFF2-40B4-BE49-F238E27FC236}">
+                  <a16:creationId xmlns:a16="http://schemas.microsoft.com/office/drawing/2014/main" id="{39D80267-9C1E-4CBB-9E4C-BF7D6323ABE2}"/>
+                </a:ext>
+              </a:extLst>
+            </p:cNvPr>
+            <p:cNvCxnSpPr>
+              <a:cxnSpLocks/>
+              <a:stCxn id="26" idx="1"/>
+            </p:cNvCxnSpPr>
+            <p:nvPr/>
+          </p:nvCxnSpPr>
+          <p:spPr>
+            <a:xfrm flipH="1" flipV="1">
+              <a:off x="3629026" y="3780773"/>
+              <a:ext cx="714372" cy="1993572"/>
+            </a:xfrm>
+            <a:prstGeom prst="line">
+              <a:avLst/>
+            </a:prstGeom>
+            <a:ln w="19050">
+              <a:solidFill>
+                <a:schemeClr val="tx1"/>
+              </a:solidFill>
+            </a:ln>
+          </p:spPr>
+          <p:style>
+            <a:lnRef idx="1">
+              <a:schemeClr val="accent1"/>
+            </a:lnRef>
+            <a:fillRef idx="0">
+              <a:schemeClr val="accent1"/>
+            </a:fillRef>
+            <a:effectRef idx="0">
+              <a:schemeClr val="accent1"/>
+            </a:effectRef>
+            <a:fontRef idx="minor">
+              <a:schemeClr val="tx1"/>
+            </a:fontRef>
+          </p:style>
+        </p:cxnSp>
+        <p:cxnSp>
+          <p:nvCxnSpPr>
+            <p:cNvPr id="43" name="Straight Connector 42">
+              <a:extLst>
+                <a:ext uri="{FF2B5EF4-FFF2-40B4-BE49-F238E27FC236}">
+                  <a16:creationId xmlns:a16="http://schemas.microsoft.com/office/drawing/2014/main" id="{EE167F48-9FEB-4EFE-8356-52E6E70A9357}"/>
+                </a:ext>
+              </a:extLst>
+            </p:cNvPr>
+            <p:cNvCxnSpPr>
+              <a:cxnSpLocks/>
+              <a:stCxn id="24" idx="3"/>
+              <a:endCxn id="28" idx="1"/>
+            </p:cNvCxnSpPr>
+            <p:nvPr/>
+          </p:nvCxnSpPr>
+          <p:spPr>
+            <a:xfrm flipV="1">
+              <a:off x="6216649" y="3429000"/>
+              <a:ext cx="615126" cy="150553"/>
+            </a:xfrm>
+            <a:prstGeom prst="line">
+              <a:avLst/>
+            </a:prstGeom>
+            <a:ln w="19050">
+              <a:solidFill>
+                <a:schemeClr val="tx1"/>
+              </a:solidFill>
+            </a:ln>
+          </p:spPr>
+          <p:style>
+            <a:lnRef idx="1">
+              <a:schemeClr val="accent1"/>
+            </a:lnRef>
+            <a:fillRef idx="0">
+              <a:schemeClr val="accent1"/>
+            </a:fillRef>
+            <a:effectRef idx="0">
+              <a:schemeClr val="accent1"/>
+            </a:effectRef>
+            <a:fontRef idx="minor">
+              <a:schemeClr val="tx1"/>
+            </a:fontRef>
+          </p:style>
+        </p:cxnSp>
+        <p:cxnSp>
+          <p:nvCxnSpPr>
+            <p:cNvPr id="46" name="Straight Connector 45">
+              <a:extLst>
+                <a:ext uri="{FF2B5EF4-FFF2-40B4-BE49-F238E27FC236}">
+                  <a16:creationId xmlns:a16="http://schemas.microsoft.com/office/drawing/2014/main" id="{1A9C85EC-0DD1-4788-BDC3-E6183696AE86}"/>
+                </a:ext>
+              </a:extLst>
+            </p:cNvPr>
+            <p:cNvCxnSpPr>
+              <a:cxnSpLocks/>
+              <a:stCxn id="21" idx="3"/>
+            </p:cNvCxnSpPr>
+            <p:nvPr/>
+          </p:nvCxnSpPr>
+          <p:spPr>
+            <a:xfrm>
+              <a:off x="6216649" y="1384761"/>
+              <a:ext cx="1027115" cy="1687945"/>
+            </a:xfrm>
+            <a:prstGeom prst="line">
+              <a:avLst/>
+            </a:prstGeom>
+            <a:ln w="19050">
+              <a:solidFill>
+                <a:schemeClr val="tx1"/>
+              </a:solidFill>
+            </a:ln>
+          </p:spPr>
+          <p:style>
+            <a:lnRef idx="1">
+              <a:schemeClr val="accent1"/>
+            </a:lnRef>
+            <a:fillRef idx="0">
+              <a:schemeClr val="accent1"/>
+            </a:fillRef>
+            <a:effectRef idx="0">
+              <a:schemeClr val="accent1"/>
+            </a:effectRef>
+            <a:fontRef idx="minor">
+              <a:schemeClr val="tx1"/>
+            </a:fontRef>
+          </p:style>
+        </p:cxnSp>
+        <p:cxnSp>
+          <p:nvCxnSpPr>
+            <p:cNvPr id="49" name="Straight Connector 48">
+              <a:extLst>
+                <a:ext uri="{FF2B5EF4-FFF2-40B4-BE49-F238E27FC236}">
+                  <a16:creationId xmlns:a16="http://schemas.microsoft.com/office/drawing/2014/main" id="{7434E248-DF44-49B4-8378-375DBD896BEA}"/>
+                </a:ext>
+              </a:extLst>
+            </p:cNvPr>
+            <p:cNvCxnSpPr>
+              <a:cxnSpLocks/>
+              <a:stCxn id="26" idx="3"/>
+            </p:cNvCxnSpPr>
+            <p:nvPr/>
+          </p:nvCxnSpPr>
+          <p:spPr>
+            <a:xfrm flipV="1">
+              <a:off x="6222998" y="3775450"/>
+              <a:ext cx="889012" cy="1998895"/>
+            </a:xfrm>
+            <a:prstGeom prst="line">
+              <a:avLst/>
+            </a:prstGeom>
+            <a:ln w="19050">
+              <a:solidFill>
+                <a:schemeClr val="tx1"/>
+              </a:solidFill>
+            </a:ln>
+          </p:spPr>
+          <p:style>
+            <a:lnRef idx="1">
+              <a:schemeClr val="accent1"/>
+            </a:lnRef>
+            <a:fillRef idx="0">
+              <a:schemeClr val="accent1"/>
+            </a:fillRef>
+            <a:effectRef idx="0">
+              <a:schemeClr val="accent1"/>
+            </a:effectRef>
+            <a:fontRef idx="minor">
+              <a:schemeClr val="tx1"/>
+            </a:fontRef>
+          </p:style>
+        </p:cxnSp>
+        <p:cxnSp>
+          <p:nvCxnSpPr>
+            <p:cNvPr id="52" name="Straight Connector 51">
+              <a:extLst>
+                <a:ext uri="{FF2B5EF4-FFF2-40B4-BE49-F238E27FC236}">
+                  <a16:creationId xmlns:a16="http://schemas.microsoft.com/office/drawing/2014/main" id="{02710F9A-0AD3-4104-9B01-9112BD4A261A}"/>
+                </a:ext>
+              </a:extLst>
+            </p:cNvPr>
+            <p:cNvCxnSpPr>
+              <a:cxnSpLocks/>
+              <a:stCxn id="29" idx="1"/>
+            </p:cNvCxnSpPr>
+            <p:nvPr/>
+          </p:nvCxnSpPr>
+          <p:spPr>
+            <a:xfrm flipH="1">
+              <a:off x="8096249" y="1569676"/>
+              <a:ext cx="895359" cy="1503030"/>
+            </a:xfrm>
+            <a:prstGeom prst="line">
+              <a:avLst/>
+            </a:prstGeom>
+            <a:ln w="19050">
+              <a:solidFill>
+                <a:schemeClr val="tx1"/>
+              </a:solidFill>
+            </a:ln>
+          </p:spPr>
+          <p:style>
+            <a:lnRef idx="1">
+              <a:schemeClr val="accent1"/>
+            </a:lnRef>
+            <a:fillRef idx="0">
+              <a:schemeClr val="accent1"/>
+            </a:fillRef>
+            <a:effectRef idx="0">
+              <a:schemeClr val="accent1"/>
+            </a:effectRef>
+            <a:fontRef idx="minor">
+              <a:schemeClr val="tx1"/>
+            </a:fontRef>
+          </p:style>
+        </p:cxnSp>
+        <p:grpSp>
+          <p:nvGrpSpPr>
+            <p:cNvPr id="63" name="Group 62">
+              <a:extLst>
+                <a:ext uri="{FF2B5EF4-FFF2-40B4-BE49-F238E27FC236}">
+                  <a16:creationId xmlns:a16="http://schemas.microsoft.com/office/drawing/2014/main" id="{292991CF-8993-492F-8C9A-2163F9168F8F}"/>
+                </a:ext>
+              </a:extLst>
+            </p:cNvPr>
+            <p:cNvGrpSpPr/>
+            <p:nvPr/>
+          </p:nvGrpSpPr>
+          <p:grpSpPr>
+            <a:xfrm>
+              <a:off x="8991610" y="5398728"/>
+              <a:ext cx="1879600" cy="1394752"/>
+              <a:chOff x="8439152" y="3210669"/>
+              <a:chExt cx="1879600" cy="1394752"/>
+            </a:xfrm>
+          </p:grpSpPr>
+          <p:sp>
+            <p:nvSpPr>
+              <p:cNvPr id="64" name="Rectangle 63">
+                <a:extLst>
+                  <a:ext uri="{FF2B5EF4-FFF2-40B4-BE49-F238E27FC236}">
+                    <a16:creationId xmlns:a16="http://schemas.microsoft.com/office/drawing/2014/main" id="{43140DBE-7F04-40CD-BCA0-84D9A2CB927D}"/>
+                  </a:ext>
+                </a:extLst>
+              </p:cNvPr>
+              <p:cNvSpPr/>
+              <p:nvPr/>
+            </p:nvSpPr>
+            <p:spPr>
+              <a:xfrm>
+                <a:off x="8439152" y="3210669"/>
+                <a:ext cx="1879600" cy="1394752"/>
+              </a:xfrm>
+              <a:prstGeom prst="rect">
+                <a:avLst/>
+              </a:prstGeom>
+              <a:solidFill>
+                <a:schemeClr val="accent1">
+                  <a:lumMod val="40000"/>
+                  <a:lumOff val="60000"/>
+                </a:schemeClr>
+              </a:solidFill>
+            </p:spPr>
+            <p:style>
+              <a:lnRef idx="2">
+                <a:schemeClr val="accent1">
+                  <a:shade val="50000"/>
+                </a:schemeClr>
+              </a:lnRef>
+              <a:fillRef idx="1">
+                <a:schemeClr val="accent1"/>
+              </a:fillRef>
+              <a:effectRef idx="0">
+                <a:schemeClr val="accent1"/>
+              </a:effectRef>
+              <a:fontRef idx="minor">
+                <a:schemeClr val="lt1"/>
+              </a:fontRef>
+            </p:style>
+            <p:txBody>
+              <a:bodyPr rtlCol="0" anchor="b"/>
+              <a:lstStyle/>
+              <a:p>
+                <a:pPr algn="ctr"/>
+                <a:r>
+                  <a:rPr lang="en-SG" b="1" dirty="0">
+                    <a:solidFill>
+                      <a:sysClr val="windowText" lastClr="000000"/>
+                    </a:solidFill>
+                  </a:rPr>
+                  <a:t>Document ranking</a:t>
+                </a:r>
+              </a:p>
+            </p:txBody>
+          </p:sp>
+          <p:sp>
+            <p:nvSpPr>
+              <p:cNvPr id="65" name="Rectangle 64">
+                <a:extLst>
+                  <a:ext uri="{FF2B5EF4-FFF2-40B4-BE49-F238E27FC236}">
+                    <a16:creationId xmlns:a16="http://schemas.microsoft.com/office/drawing/2014/main" id="{54EFE96F-5879-4693-88BD-8CBB1B5E069D}"/>
+                  </a:ext>
+                </a:extLst>
+              </p:cNvPr>
+              <p:cNvSpPr/>
+              <p:nvPr/>
+            </p:nvSpPr>
+            <p:spPr>
+              <a:xfrm>
+                <a:off x="8559801" y="3340205"/>
+                <a:ext cx="1638299" cy="666750"/>
+              </a:xfrm>
+              <a:prstGeom prst="rect">
+                <a:avLst/>
+              </a:prstGeom>
+            </p:spPr>
+            <p:style>
+              <a:lnRef idx="2">
+                <a:schemeClr val="accent6"/>
+              </a:lnRef>
+              <a:fillRef idx="1">
+                <a:schemeClr val="lt1"/>
+              </a:fillRef>
+              <a:effectRef idx="0">
+                <a:schemeClr val="accent6"/>
+              </a:effectRef>
+              <a:fontRef idx="minor">
+                <a:schemeClr val="dk1"/>
+              </a:fontRef>
+            </p:style>
+            <p:txBody>
+              <a:bodyPr rtlCol="0" anchor="ctr"/>
+              <a:lstStyle/>
+              <a:p>
+                <a:pPr algn="ctr"/>
+                <a:r>
+                  <a:rPr lang="en-SG" dirty="0"/>
+                  <a:t>Eval</a:t>
+                </a:r>
+              </a:p>
+            </p:txBody>
+          </p:sp>
+        </p:grpSp>
+        <p:cxnSp>
+          <p:nvCxnSpPr>
+            <p:cNvPr id="71" name="Straight Connector 70">
+              <a:extLst>
+                <a:ext uri="{FF2B5EF4-FFF2-40B4-BE49-F238E27FC236}">
+                  <a16:creationId xmlns:a16="http://schemas.microsoft.com/office/drawing/2014/main" id="{893C9F9A-8A96-40E6-9E2D-BF1E4E7E0222}"/>
+                </a:ext>
+              </a:extLst>
+            </p:cNvPr>
+            <p:cNvCxnSpPr>
+              <a:cxnSpLocks/>
+              <a:stCxn id="31" idx="1"/>
+              <a:endCxn id="28" idx="3"/>
+            </p:cNvCxnSpPr>
+            <p:nvPr/>
+          </p:nvCxnSpPr>
+          <p:spPr>
+            <a:xfrm flipH="1" flipV="1">
+              <a:off x="8470074" y="3429000"/>
+              <a:ext cx="521536" cy="693047"/>
+            </a:xfrm>
+            <a:prstGeom prst="line">
+              <a:avLst/>
+            </a:prstGeom>
+            <a:ln w="19050">
+              <a:solidFill>
+                <a:schemeClr val="tx1"/>
+              </a:solidFill>
+            </a:ln>
+          </p:spPr>
+          <p:style>
+            <a:lnRef idx="1">
+              <a:schemeClr val="accent1"/>
+            </a:lnRef>
+            <a:fillRef idx="0">
+              <a:schemeClr val="accent1"/>
+            </a:fillRef>
+            <a:effectRef idx="0">
+              <a:schemeClr val="accent1"/>
+            </a:effectRef>
+            <a:fontRef idx="minor">
+              <a:schemeClr val="tx1"/>
+            </a:fontRef>
+          </p:style>
+        </p:cxnSp>
+        <p:cxnSp>
+          <p:nvCxnSpPr>
+            <p:cNvPr id="74" name="Straight Connector 73">
+              <a:extLst>
+                <a:ext uri="{FF2B5EF4-FFF2-40B4-BE49-F238E27FC236}">
+                  <a16:creationId xmlns:a16="http://schemas.microsoft.com/office/drawing/2014/main" id="{3F500D94-6608-4E7C-A4BB-357D9AA77640}"/>
+                </a:ext>
+              </a:extLst>
+            </p:cNvPr>
+            <p:cNvCxnSpPr>
+              <a:cxnSpLocks/>
+              <a:stCxn id="32" idx="0"/>
+              <a:endCxn id="28" idx="2"/>
+            </p:cNvCxnSpPr>
+            <p:nvPr/>
+          </p:nvCxnSpPr>
+          <p:spPr>
+            <a:xfrm flipV="1">
+              <a:off x="7607304" y="3762375"/>
+              <a:ext cx="43621" cy="1824877"/>
+            </a:xfrm>
+            <a:prstGeom prst="line">
+              <a:avLst/>
+            </a:prstGeom>
+            <a:ln w="19050">
+              <a:solidFill>
+                <a:schemeClr val="tx1"/>
+              </a:solidFill>
+            </a:ln>
+          </p:spPr>
+          <p:style>
+            <a:lnRef idx="1">
+              <a:schemeClr val="accent1"/>
+            </a:lnRef>
+            <a:fillRef idx="0">
+              <a:schemeClr val="accent1"/>
+            </a:fillRef>
+            <a:effectRef idx="0">
+              <a:schemeClr val="accent1"/>
+            </a:effectRef>
+            <a:fontRef idx="minor">
+              <a:schemeClr val="tx1"/>
+            </a:fontRef>
+          </p:style>
+        </p:cxnSp>
+        <p:cxnSp>
+          <p:nvCxnSpPr>
+            <p:cNvPr id="77" name="Straight Connector 76">
+              <a:extLst>
+                <a:ext uri="{FF2B5EF4-FFF2-40B4-BE49-F238E27FC236}">
+                  <a16:creationId xmlns:a16="http://schemas.microsoft.com/office/drawing/2014/main" id="{B0A52577-653F-463A-A34C-AB4E54B8970B}"/>
+                </a:ext>
+              </a:extLst>
+            </p:cNvPr>
+            <p:cNvCxnSpPr>
+              <a:cxnSpLocks/>
+            </p:cNvCxnSpPr>
+            <p:nvPr/>
+          </p:nvCxnSpPr>
+          <p:spPr>
+            <a:xfrm flipH="1" flipV="1">
+              <a:off x="8102598" y="3785295"/>
+              <a:ext cx="889009" cy="1742969"/>
+            </a:xfrm>
+            <a:prstGeom prst="line">
+              <a:avLst/>
+            </a:prstGeom>
+            <a:ln w="19050">
+              <a:solidFill>
+                <a:schemeClr val="tx1"/>
+              </a:solidFill>
+            </a:ln>
+          </p:spPr>
+          <p:style>
+            <a:lnRef idx="1">
+              <a:schemeClr val="accent1"/>
+            </a:lnRef>
+            <a:fillRef idx="0">
+              <a:schemeClr val="accent1"/>
+            </a:fillRef>
+            <a:effectRef idx="0">
+              <a:schemeClr val="accent1"/>
+            </a:effectRef>
+            <a:fontRef idx="minor">
+              <a:schemeClr val="tx1"/>
+            </a:fontRef>
+          </p:style>
+        </p:cxnSp>
       </p:grpSp>
     </p:spTree>
     <p:extLst>

</xml_diff>